<commit_message>
update for loops presentation
</commit_message>
<xml_diff>
--- a/Week07/ForLoops.pptx
+++ b/Week07/ForLoops.pptx
@@ -217,7 +217,7 @@
           <a:p>
             <a:fld id="{C6F729B2-88F7-4E6F-824D-2DF0F48F5690}" type="datetimeFigureOut">
               <a:rPr lang="en-US" smtClean="0"/>
-              <a:t>3/18/2019</a:t>
+              <a:t>3/19/2019</a:t>
             </a:fld>
             <a:endParaRPr lang="en-US"/>
           </a:p>
@@ -382,7 +382,7 @@
           <a:p>
             <a:fld id="{44CE7EC2-7BCB-42F7-BBE2-6EF58549A0DA}" type="datetimeFigureOut">
               <a:rPr lang="en-US" smtClean="0"/>
-              <a:t>3/18/2019</a:t>
+              <a:t>3/19/2019</a:t>
             </a:fld>
             <a:endParaRPr lang="en-US"/>
           </a:p>
@@ -10833,7 +10833,19 @@
           <a:p>
             <a:r>
               <a:rPr lang="en-US" dirty="0" smtClean="0"/>
-              <a:t>Used for repeating an piece of code multiple times</a:t>
+              <a:t>Used for </a:t>
+            </a:r>
+            <a:r>
+              <a:rPr lang="en-US" smtClean="0"/>
+              <a:t>repeating </a:t>
+            </a:r>
+            <a:r>
+              <a:rPr lang="en-US" smtClean="0"/>
+              <a:t>a </a:t>
+            </a:r>
+            <a:r>
+              <a:rPr lang="en-US" dirty="0" smtClean="0"/>
+              <a:t>piece of code multiple times</a:t>
             </a:r>
             <a:br>
               <a:rPr lang="en-US" dirty="0" smtClean="0"/>
@@ -10914,7 +10926,7 @@
               <a:t>; </a:t>
             </a:r>
             <a:r>
-              <a:rPr lang="fr-FR" i="1">
+              <a:rPr lang="fr-FR" i="1" dirty="0">
                 <a:solidFill>
                   <a:schemeClr val="accent3"/>
                 </a:solidFill>
@@ -10923,7 +10935,7 @@
               <a:t>modifier</a:t>
             </a:r>
             <a:r>
-              <a:rPr lang="fr-FR" smtClean="0">
+              <a:rPr lang="fr-FR" dirty="0" smtClean="0">
                 <a:solidFill>
                   <a:srgbClr val="000000"/>
                 </a:solidFill>
@@ -10937,7 +10949,7 @@
               <a:buNone/>
             </a:pPr>
             <a:r>
-              <a:rPr lang="fr-FR" smtClean="0">
+              <a:rPr lang="fr-FR" dirty="0" smtClean="0">
                 <a:solidFill>
                   <a:srgbClr val="000000"/>
                 </a:solidFill>

</xml_diff>